<commit_message>
Agregué los ultimos detalles a mis partes de la segunda entrega
</commit_message>
<xml_diff>
--- a/Segunda entrega/SegundaEntrega.pptx
+++ b/Segunda entrega/SegundaEntrega.pptx
@@ -14,8 +14,8 @@
     <p:sldId id="258" r:id="rId5"/>
     <p:sldId id="261" r:id="rId6"/>
     <p:sldId id="265" r:id="rId7"/>
-    <p:sldId id="262" r:id="rId8"/>
-    <p:sldId id="263" r:id="rId9"/>
+    <p:sldId id="266" r:id="rId8"/>
+    <p:sldId id="267" r:id="rId9"/>
     <p:sldId id="264" r:id="rId10"/>
   </p:sldIdLst>
   <p:sldSz cx="9144000" cy="5143500" type="screen16x9"/>
@@ -274,6 +274,119 @@
     </p:ext>
   </p:extLst>
 </p:presentation>
+</file>
+
+<file path=ppt/revisionInfo.xml><?xml version="1.0" encoding="utf-8"?>
+<p1510:revInfo xmlns:a="http://schemas.openxmlformats.org/drawingml/2006/main" xmlns:r="http://schemas.openxmlformats.org/officeDocument/2006/relationships" xmlns:p1510="http://schemas.microsoft.com/office/powerpoint/2015/10/main">
+  <p1510:revLst>
+    <p1510:client id="{168B3D78-E58F-4B81-B108-72D7913FE092}" v="11" dt="2019-04-12T08:34:51.447"/>
+  </p1510:revLst>
+</p1510:revInfo>
+</file>
+
+<file path=ppt/changesInfos/changesInfo1.xml><?xml version="1.0" encoding="utf-8"?>
+<pc:chgInfo xmlns:a="http://schemas.openxmlformats.org/drawingml/2006/main" xmlns:r="http://schemas.openxmlformats.org/officeDocument/2006/relationships" xmlns:ac="http://schemas.microsoft.com/office/drawing/2013/main/command" xmlns:pc="http://schemas.microsoft.com/office/powerpoint/2013/main/command">
+  <pc:docChgLst>
+    <pc:chgData name="Edwin Fajardo Barrera" userId="6e135ce4aab9c272" providerId="LiveId" clId="{168B3D78-E58F-4B81-B108-72D7913FE092}"/>
+    <pc:docChg chg="custSel addSld delSld modSld">
+      <pc:chgData name="Edwin Fajardo Barrera" userId="6e135ce4aab9c272" providerId="LiveId" clId="{168B3D78-E58F-4B81-B108-72D7913FE092}" dt="2019-04-12T08:35:25.694" v="68" actId="478"/>
+      <pc:docMkLst>
+        <pc:docMk/>
+      </pc:docMkLst>
+      <pc:sldChg chg="del">
+        <pc:chgData name="Edwin Fajardo Barrera" userId="6e135ce4aab9c272" providerId="LiveId" clId="{168B3D78-E58F-4B81-B108-72D7913FE092}" dt="2019-04-12T08:15:57.838" v="1" actId="2696"/>
+        <pc:sldMkLst>
+          <pc:docMk/>
+          <pc:sldMk cId="2002569772" sldId="262"/>
+        </pc:sldMkLst>
+      </pc:sldChg>
+      <pc:sldChg chg="del">
+        <pc:chgData name="Edwin Fajardo Barrera" userId="6e135ce4aab9c272" providerId="LiveId" clId="{168B3D78-E58F-4B81-B108-72D7913FE092}" dt="2019-04-12T08:15:57.788" v="0" actId="2696"/>
+        <pc:sldMkLst>
+          <pc:docMk/>
+          <pc:sldMk cId="2779586770" sldId="263"/>
+        </pc:sldMkLst>
+      </pc:sldChg>
+      <pc:sldChg chg="modSp">
+        <pc:chgData name="Edwin Fajardo Barrera" userId="6e135ce4aab9c272" providerId="LiveId" clId="{168B3D78-E58F-4B81-B108-72D7913FE092}" dt="2019-04-12T08:31:55.120" v="66" actId="1076"/>
+        <pc:sldMkLst>
+          <pc:docMk/>
+          <pc:sldMk cId="2462632363" sldId="265"/>
+        </pc:sldMkLst>
+        <pc:picChg chg="mod">
+          <ac:chgData name="Edwin Fajardo Barrera" userId="6e135ce4aab9c272" providerId="LiveId" clId="{168B3D78-E58F-4B81-B108-72D7913FE092}" dt="2019-04-12T08:31:55.120" v="66" actId="1076"/>
+          <ac:picMkLst>
+            <pc:docMk/>
+            <pc:sldMk cId="2462632363" sldId="265"/>
+            <ac:picMk id="8" creationId="{132D4C3C-5389-40FA-BAA3-BC97E14C4AD2}"/>
+          </ac:picMkLst>
+        </pc:picChg>
+      </pc:sldChg>
+      <pc:sldChg chg="addSp delSp modSp add">
+        <pc:chgData name="Edwin Fajardo Barrera" userId="6e135ce4aab9c272" providerId="LiveId" clId="{168B3D78-E58F-4B81-B108-72D7913FE092}" dt="2019-04-12T08:35:25.694" v="68" actId="478"/>
+        <pc:sldMkLst>
+          <pc:docMk/>
+          <pc:sldMk cId="2613076774" sldId="266"/>
+        </pc:sldMkLst>
+        <pc:spChg chg="del">
+          <ac:chgData name="Edwin Fajardo Barrera" userId="6e135ce4aab9c272" providerId="LiveId" clId="{168B3D78-E58F-4B81-B108-72D7913FE092}" dt="2019-04-12T08:16:13.448" v="5" actId="478"/>
+          <ac:spMkLst>
+            <pc:docMk/>
+            <pc:sldMk cId="2613076774" sldId="266"/>
+            <ac:spMk id="2" creationId="{3414B4B9-C88C-430C-83BB-C28444AD6220}"/>
+          </ac:spMkLst>
+        </pc:spChg>
+        <pc:spChg chg="add mod">
+          <ac:chgData name="Edwin Fajardo Barrera" userId="6e135ce4aab9c272" providerId="LiveId" clId="{168B3D78-E58F-4B81-B108-72D7913FE092}" dt="2019-04-12T08:17:53.848" v="39" actId="20577"/>
+          <ac:spMkLst>
+            <pc:docMk/>
+            <pc:sldMk cId="2613076774" sldId="266"/>
+            <ac:spMk id="4" creationId="{C5CCDFBA-0D07-4028-93D8-D0E8FD2FD51C}"/>
+          </ac:spMkLst>
+        </pc:spChg>
+        <pc:picChg chg="add del">
+          <ac:chgData name="Edwin Fajardo Barrera" userId="6e135ce4aab9c272" providerId="LiveId" clId="{168B3D78-E58F-4B81-B108-72D7913FE092}" dt="2019-04-12T08:35:25.694" v="68" actId="478"/>
+          <ac:picMkLst>
+            <pc:docMk/>
+            <pc:sldMk cId="2613076774" sldId="266"/>
+            <ac:picMk id="2" creationId="{4CD1BA4D-55CA-42AD-A1F8-F742EE9C4435}"/>
+          </ac:picMkLst>
+        </pc:picChg>
+      </pc:sldChg>
+      <pc:sldChg chg="addSp delSp modSp add">
+        <pc:chgData name="Edwin Fajardo Barrera" userId="6e135ce4aab9c272" providerId="LiveId" clId="{168B3D78-E58F-4B81-B108-72D7913FE092}" dt="2019-04-12T08:18:49.893" v="65" actId="1076"/>
+        <pc:sldMkLst>
+          <pc:docMk/>
+          <pc:sldMk cId="2891273861" sldId="267"/>
+        </pc:sldMkLst>
+        <pc:spChg chg="del">
+          <ac:chgData name="Edwin Fajardo Barrera" userId="6e135ce4aab9c272" providerId="LiveId" clId="{168B3D78-E58F-4B81-B108-72D7913FE092}" dt="2019-04-12T08:16:03.402" v="4" actId="478"/>
+          <ac:spMkLst>
+            <pc:docMk/>
+            <pc:sldMk cId="2891273861" sldId="267"/>
+            <ac:spMk id="2" creationId="{8833CE80-E4B5-4A64-AA83-3030C68B7B64}"/>
+          </ac:spMkLst>
+        </pc:spChg>
+        <pc:spChg chg="mod">
+          <ac:chgData name="Edwin Fajardo Barrera" userId="6e135ce4aab9c272" providerId="LiveId" clId="{168B3D78-E58F-4B81-B108-72D7913FE092}" dt="2019-04-12T08:18:04.087" v="41"/>
+          <ac:spMkLst>
+            <pc:docMk/>
+            <pc:sldMk cId="2891273861" sldId="267"/>
+            <ac:spMk id="3" creationId="{17867632-75F7-4A56-8DD8-F63832551B87}"/>
+          </ac:spMkLst>
+        </pc:spChg>
+        <pc:spChg chg="add mod">
+          <ac:chgData name="Edwin Fajardo Barrera" userId="6e135ce4aab9c272" providerId="LiveId" clId="{168B3D78-E58F-4B81-B108-72D7913FE092}" dt="2019-04-12T08:18:49.893" v="65" actId="1076"/>
+          <ac:spMkLst>
+            <pc:docMk/>
+            <pc:sldMk cId="2891273861" sldId="267"/>
+            <ac:spMk id="4" creationId="{4C5F1AFD-8196-4EE9-9DD6-FC57413D247C}"/>
+          </ac:spMkLst>
+        </pc:spChg>
+      </pc:sldChg>
+    </pc:docChg>
+  </pc:docChgLst>
+</pc:chgInfo>
 </file>
 
 <file path=ppt/notesMasters/notesMaster1.xml><?xml version="1.0" encoding="utf-8"?>
@@ -7895,7 +8008,7 @@
         </p:blipFill>
         <p:spPr>
           <a:xfrm>
-            <a:off x="6612306" y="703681"/>
+            <a:off x="6661146" y="703681"/>
             <a:ext cx="2138151" cy="3736137"/>
           </a:xfrm>
           <a:prstGeom prst="rect">
@@ -7935,10 +8048,35 @@
       </p:grpSpPr>
       <p:sp>
         <p:nvSpPr>
-          <p:cNvPr id="2" name="Título 1">
+          <p:cNvPr id="3" name="Marcador de texto 2">
             <a:extLst>
               <a:ext uri="{FF2B5EF4-FFF2-40B4-BE49-F238E27FC236}">
-                <a16:creationId xmlns:a16="http://schemas.microsoft.com/office/drawing/2014/main" id="{A8E2D766-4470-43EA-94FD-E06CDAF01D2F}"/>
+                <a16:creationId xmlns:a16="http://schemas.microsoft.com/office/drawing/2014/main" id="{CB652B6E-33B5-4FE8-85A5-8FAF74893F4E}"/>
+              </a:ext>
+            </a:extLst>
+          </p:cNvPr>
+          <p:cNvSpPr>
+            <a:spLocks noGrp="1"/>
+          </p:cNvSpPr>
+          <p:nvPr>
+            <p:ph type="body" idx="1"/>
+          </p:nvPr>
+        </p:nvSpPr>
+        <p:spPr/>
+        <p:txBody>
+          <a:bodyPr/>
+          <a:lstStyle/>
+          <a:p>
+            <a:endParaRPr lang="es-MX" dirty="0"/>
+          </a:p>
+        </p:txBody>
+      </p:sp>
+      <p:sp>
+        <p:nvSpPr>
+          <p:cNvPr id="4" name="Título 1">
+            <a:extLst>
+              <a:ext uri="{FF2B5EF4-FFF2-40B4-BE49-F238E27FC236}">
+                <a16:creationId xmlns:a16="http://schemas.microsoft.com/office/drawing/2014/main" id="{C5CCDFBA-0D07-4028-93D8-D0E8FD2FD51C}"/>
               </a:ext>
             </a:extLst>
           </p:cNvPr>
@@ -7951,7 +8089,7 @@
         </p:nvSpPr>
         <p:spPr>
           <a:xfrm>
-            <a:off x="2021357" y="23065"/>
+            <a:off x="1073700" y="101562"/>
             <a:ext cx="6996600" cy="715800"/>
           </a:xfrm>
         </p:spPr>
@@ -7966,7 +8104,7 @@
                 </a:solidFill>
                 <a:latin typeface="Yanone Kaffeesatz" panose="020B0604020202020204" charset="0"/>
               </a:rPr>
-              <a:t>P</a:t>
+              <a:t>M</a:t>
             </a:r>
             <a:r>
               <a:rPr lang="es-MX" sz="4400" dirty="0">
@@ -7975,365 +8113,7 @@
                 </a:solidFill>
                 <a:latin typeface="Yanone Kaffeesatz" panose="020B0604020202020204" charset="0"/>
               </a:rPr>
-              <a:t>erfiles, </a:t>
-            </a:r>
-            <a:r>
-              <a:rPr lang="es-MX" sz="4400" dirty="0">
-                <a:solidFill>
-                  <a:srgbClr val="1155CC"/>
-                </a:solidFill>
-                <a:latin typeface="Yanone Kaffeesatz" panose="020B0604020202020204" charset="0"/>
-              </a:rPr>
-              <a:t>P</a:t>
-            </a:r>
-            <a:r>
-              <a:rPr lang="es-MX" sz="4400" dirty="0">
-                <a:solidFill>
-                  <a:schemeClr val="tx1"/>
-                </a:solidFill>
-                <a:latin typeface="Yanone Kaffeesatz" panose="020B0604020202020204" charset="0"/>
-              </a:rPr>
-              <a:t>ersonas, </a:t>
-            </a:r>
-            <a:r>
-              <a:rPr lang="es-MX" sz="4400" dirty="0">
-                <a:solidFill>
-                  <a:srgbClr val="1155CC"/>
-                </a:solidFill>
-                <a:latin typeface="Yanone Kaffeesatz" panose="020B0604020202020204" charset="0"/>
-              </a:rPr>
-              <a:t>E</a:t>
-            </a:r>
-            <a:r>
-              <a:rPr lang="es-MX" sz="4400" dirty="0">
-                <a:solidFill>
-                  <a:schemeClr val="tx1"/>
-                </a:solidFill>
-                <a:latin typeface="Yanone Kaffeesatz" panose="020B0604020202020204" charset="0"/>
-              </a:rPr>
-              <a:t>scenarios</a:t>
-            </a:r>
-          </a:p>
-        </p:txBody>
-      </p:sp>
-      <p:pic>
-        <p:nvPicPr>
-          <p:cNvPr id="4" name="Imagen 3" descr="esultado de imagen para joven yucateco">
-            <a:extLst>
-              <a:ext uri="{FF2B5EF4-FFF2-40B4-BE49-F238E27FC236}">
-                <a16:creationId xmlns:a16="http://schemas.microsoft.com/office/drawing/2014/main" id="{BA725D68-A65D-42B9-B38E-0C3547A30DAC}"/>
-              </a:ext>
-            </a:extLst>
-          </p:cNvPr>
-          <p:cNvPicPr/>
-          <p:nvPr/>
-        </p:nvPicPr>
-        <p:blipFill>
-          <a:blip r:embed="rId2">
-            <a:extLst>
-              <a:ext uri="{28A0092B-C50C-407E-A947-70E740481C1C}">
-                <a14:useLocalDpi xmlns:a14="http://schemas.microsoft.com/office/drawing/2010/main" val="0"/>
-              </a:ext>
-            </a:extLst>
-          </a:blip>
-          <a:srcRect/>
-          <a:stretch>
-            <a:fillRect/>
-          </a:stretch>
-        </p:blipFill>
-        <p:spPr bwMode="auto">
-          <a:xfrm>
-            <a:off x="136582" y="341104"/>
-            <a:ext cx="2233129" cy="1736538"/>
-          </a:xfrm>
-          <a:prstGeom prst="rect">
-            <a:avLst/>
-          </a:prstGeom>
-          <a:ln w="38100" cap="sq">
-            <a:solidFill>
-              <a:srgbClr val="000000"/>
-            </a:solidFill>
-            <a:prstDash val="solid"/>
-            <a:miter lim="800000"/>
-          </a:ln>
-          <a:effectLst>
-            <a:outerShdw blurRad="50800" dist="38100" dir="2700000" algn="tl" rotWithShape="0">
-              <a:srgbClr val="000000">
-                <a:alpha val="43000"/>
-              </a:srgbClr>
-            </a:outerShdw>
-          </a:effectLst>
-        </p:spPr>
-      </p:pic>
-      <p:pic>
-        <p:nvPicPr>
-          <p:cNvPr id="5" name="Imagen 4" descr="esultado de imagen para joven yucateco">
-            <a:extLst>
-              <a:ext uri="{FF2B5EF4-FFF2-40B4-BE49-F238E27FC236}">
-                <a16:creationId xmlns:a16="http://schemas.microsoft.com/office/drawing/2014/main" id="{F441BC41-1E78-42F5-A9AA-B6A91AFB5B57}"/>
-              </a:ext>
-            </a:extLst>
-          </p:cNvPr>
-          <p:cNvPicPr/>
-          <p:nvPr/>
-        </p:nvPicPr>
-        <p:blipFill>
-          <a:blip r:embed="rId3">
-            <a:extLst>
-              <a:ext uri="{28A0092B-C50C-407E-A947-70E740481C1C}">
-                <a14:useLocalDpi xmlns:a14="http://schemas.microsoft.com/office/drawing/2010/main" val="0"/>
-              </a:ext>
-            </a:extLst>
-          </a:blip>
-          <a:srcRect/>
-          <a:stretch>
-            <a:fillRect/>
-          </a:stretch>
-        </p:blipFill>
-        <p:spPr bwMode="auto">
-          <a:xfrm>
-            <a:off x="247325" y="2328635"/>
-            <a:ext cx="1657050" cy="2213220"/>
-          </a:xfrm>
-          <a:prstGeom prst="rect">
-            <a:avLst/>
-          </a:prstGeom>
-          <a:ln w="38100" cap="sq">
-            <a:solidFill>
-              <a:srgbClr val="000000"/>
-            </a:solidFill>
-            <a:prstDash val="solid"/>
-            <a:miter lim="800000"/>
-          </a:ln>
-          <a:effectLst>
-            <a:outerShdw blurRad="50800" dist="38100" dir="2700000" algn="tl" rotWithShape="0">
-              <a:srgbClr val="000000">
-                <a:alpha val="43000"/>
-              </a:srgbClr>
-            </a:outerShdw>
-          </a:effectLst>
-        </p:spPr>
-      </p:pic>
-      <p:pic>
-        <p:nvPicPr>
-          <p:cNvPr id="6" name="Imagen 5" descr="esultado de imagen para muchacha yucateca">
-            <a:extLst>
-              <a:ext uri="{FF2B5EF4-FFF2-40B4-BE49-F238E27FC236}">
-                <a16:creationId xmlns:a16="http://schemas.microsoft.com/office/drawing/2014/main" id="{3F25FA73-D1FD-4EDA-83A8-FDEE1ACF2852}"/>
-              </a:ext>
-            </a:extLst>
-          </p:cNvPr>
-          <p:cNvPicPr/>
-          <p:nvPr/>
-        </p:nvPicPr>
-        <p:blipFill>
-          <a:blip r:embed="rId4">
-            <a:extLst>
-              <a:ext uri="{28A0092B-C50C-407E-A947-70E740481C1C}">
-                <a14:useLocalDpi xmlns:a14="http://schemas.microsoft.com/office/drawing/2010/main" val="0"/>
-              </a:ext>
-            </a:extLst>
-          </a:blip>
-          <a:srcRect/>
-          <a:stretch>
-            <a:fillRect/>
-          </a:stretch>
-        </p:blipFill>
-        <p:spPr bwMode="auto">
-          <a:xfrm>
-            <a:off x="2120201" y="2615013"/>
-            <a:ext cx="2019719" cy="1640464"/>
-          </a:xfrm>
-          <a:prstGeom prst="rect">
-            <a:avLst/>
-          </a:prstGeom>
-          <a:ln w="38100" cap="sq">
-            <a:solidFill>
-              <a:srgbClr val="000000"/>
-            </a:solidFill>
-            <a:prstDash val="solid"/>
-            <a:miter lim="800000"/>
-          </a:ln>
-          <a:effectLst>
-            <a:outerShdw blurRad="50800" dist="38100" dir="2700000" algn="tl" rotWithShape="0">
-              <a:srgbClr val="000000">
-                <a:alpha val="43000"/>
-              </a:srgbClr>
-            </a:outerShdw>
-          </a:effectLst>
-        </p:spPr>
-      </p:pic>
-      <p:pic>
-        <p:nvPicPr>
-          <p:cNvPr id="7" name="Imagen 6" descr="esultado de imagen para foto de perfil">
-            <a:extLst>
-              <a:ext uri="{FF2B5EF4-FFF2-40B4-BE49-F238E27FC236}">
-                <a16:creationId xmlns:a16="http://schemas.microsoft.com/office/drawing/2014/main" id="{8265271F-AA49-4B13-9CBD-D98709A1BA93}"/>
-              </a:ext>
-            </a:extLst>
-          </p:cNvPr>
-          <p:cNvPicPr/>
-          <p:nvPr/>
-        </p:nvPicPr>
-        <p:blipFill>
-          <a:blip r:embed="rId5">
-            <a:extLst>
-              <a:ext uri="{28A0092B-C50C-407E-A947-70E740481C1C}">
-                <a14:useLocalDpi xmlns:a14="http://schemas.microsoft.com/office/drawing/2010/main" val="0"/>
-              </a:ext>
-            </a:extLst>
-          </a:blip>
-          <a:srcRect/>
-          <a:stretch>
-            <a:fillRect/>
-          </a:stretch>
-        </p:blipFill>
-        <p:spPr bwMode="auto">
-          <a:xfrm>
-            <a:off x="2666514" y="792367"/>
-            <a:ext cx="2251225" cy="1626006"/>
-          </a:xfrm>
-          <a:prstGeom prst="rect">
-            <a:avLst/>
-          </a:prstGeom>
-          <a:ln w="38100" cap="sq">
-            <a:solidFill>
-              <a:srgbClr val="000000"/>
-            </a:solidFill>
-            <a:prstDash val="solid"/>
-            <a:miter lim="800000"/>
-          </a:ln>
-          <a:effectLst>
-            <a:outerShdw blurRad="50800" dist="38100" dir="2700000" algn="tl" rotWithShape="0">
-              <a:srgbClr val="000000">
-                <a:alpha val="43000"/>
-              </a:srgbClr>
-            </a:outerShdw>
-          </a:effectLst>
-        </p:spPr>
-      </p:pic>
-      <p:sp>
-        <p:nvSpPr>
-          <p:cNvPr id="9" name="Marcador de texto 2">
-            <a:extLst>
-              <a:ext uri="{FF2B5EF4-FFF2-40B4-BE49-F238E27FC236}">
-                <a16:creationId xmlns:a16="http://schemas.microsoft.com/office/drawing/2014/main" id="{04D0EC6B-3054-4C84-9743-A04B2CAB0E0E}"/>
-              </a:ext>
-            </a:extLst>
-          </p:cNvPr>
-          <p:cNvSpPr>
-            <a:spLocks noGrp="1"/>
-          </p:cNvSpPr>
-          <p:nvPr>
-            <p:ph type="body" idx="1"/>
-          </p:nvPr>
-        </p:nvSpPr>
-        <p:spPr>
-          <a:xfrm>
-            <a:off x="5054321" y="649650"/>
-            <a:ext cx="4089679" cy="1922100"/>
-          </a:xfrm>
-        </p:spPr>
-        <p:txBody>
-          <a:bodyPr/>
-          <a:lstStyle/>
-          <a:p>
-            <a:r>
-              <a:rPr lang="es-MX" dirty="0">
-                <a:solidFill>
-                  <a:schemeClr val="tx1"/>
-                </a:solidFill>
-                <a:latin typeface="Yanone Kaffeesatz" panose="020B0604020202020204" charset="0"/>
-              </a:rPr>
-              <a:t>Categorización</a:t>
-            </a:r>
-          </a:p>
-          <a:p>
-            <a:r>
-              <a:rPr lang="es-MX" dirty="0">
-                <a:solidFill>
-                  <a:schemeClr val="tx1"/>
-                </a:solidFill>
-                <a:latin typeface="Yanone Kaffeesatz" panose="020B0604020202020204" charset="0"/>
-              </a:rPr>
-              <a:t>Datos personales</a:t>
-            </a:r>
-          </a:p>
-          <a:p>
-            <a:r>
-              <a:rPr lang="es-MX" dirty="0">
-                <a:solidFill>
-                  <a:schemeClr val="tx1"/>
-                </a:solidFill>
-                <a:latin typeface="Yanone Kaffeesatz" panose="020B0604020202020204" charset="0"/>
-              </a:rPr>
-              <a:t>Descripción</a:t>
-            </a:r>
-          </a:p>
-          <a:p>
-            <a:r>
-              <a:rPr lang="es-MX" dirty="0">
-                <a:solidFill>
-                  <a:schemeClr val="tx1"/>
-                </a:solidFill>
-                <a:latin typeface="Yanone Kaffeesatz" panose="020B0604020202020204" charset="0"/>
-              </a:rPr>
-              <a:t>Nivel tecnológico</a:t>
-            </a:r>
-          </a:p>
-          <a:p>
-            <a:r>
-              <a:rPr lang="es-MX" dirty="0">
-                <a:solidFill>
-                  <a:schemeClr val="tx1"/>
-                </a:solidFill>
-                <a:latin typeface="Yanone Kaffeesatz" panose="020B0604020202020204" charset="0"/>
-              </a:rPr>
-              <a:t>Intereses</a:t>
-            </a:r>
-          </a:p>
-          <a:p>
-            <a:r>
-              <a:rPr lang="es-MX" dirty="0">
-                <a:solidFill>
-                  <a:schemeClr val="tx1"/>
-                </a:solidFill>
-                <a:latin typeface="Yanone Kaffeesatz" panose="020B0604020202020204" charset="0"/>
-              </a:rPr>
-              <a:t>Frustraciones</a:t>
-            </a:r>
-          </a:p>
-          <a:p>
-            <a:r>
-              <a:rPr lang="es-MX" dirty="0">
-                <a:solidFill>
-                  <a:schemeClr val="tx1"/>
-                </a:solidFill>
-                <a:latin typeface="Yanone Kaffeesatz" panose="020B0604020202020204" charset="0"/>
-              </a:rPr>
-              <a:t>Metas</a:t>
-            </a:r>
-          </a:p>
-          <a:p>
-            <a:r>
-              <a:rPr lang="es-MX" dirty="0">
-                <a:solidFill>
-                  <a:schemeClr val="tx1"/>
-                </a:solidFill>
-                <a:latin typeface="Yanone Kaffeesatz" panose="020B0604020202020204" charset="0"/>
-              </a:rPr>
-              <a:t>Desafíos</a:t>
-            </a:r>
-          </a:p>
-          <a:p>
-            <a:r>
-              <a:rPr lang="es-MX" dirty="0">
-                <a:solidFill>
-                  <a:schemeClr val="tx1"/>
-                </a:solidFill>
-                <a:latin typeface="Yanone Kaffeesatz" panose="020B0604020202020204" charset="0"/>
-              </a:rPr>
-              <a:t>Relevancia del proyecto</a:t>
+              <a:t>étodos de inspección </a:t>
             </a:r>
           </a:p>
         </p:txBody>
@@ -8341,7 +8121,7 @@
     </p:spTree>
     <p:extLst>
       <p:ext uri="{BB962C8B-B14F-4D97-AF65-F5344CB8AC3E}">
-        <p14:creationId xmlns:p14="http://schemas.microsoft.com/office/powerpoint/2010/main" val="2002569772"/>
+        <p14:creationId xmlns:p14="http://schemas.microsoft.com/office/powerpoint/2010/main" val="2613076774"/>
       </p:ext>
     </p:extLst>
   </p:cSld>
@@ -8370,10 +8150,35 @@
       </p:grpSpPr>
       <p:sp>
         <p:nvSpPr>
-          <p:cNvPr id="2" name="Título 1">
+          <p:cNvPr id="3" name="Marcador de texto 2">
             <a:extLst>
               <a:ext uri="{FF2B5EF4-FFF2-40B4-BE49-F238E27FC236}">
-                <a16:creationId xmlns:a16="http://schemas.microsoft.com/office/drawing/2014/main" id="{08174E46-1E08-40D7-BE2E-A519C8B5142F}"/>
+                <a16:creationId xmlns:a16="http://schemas.microsoft.com/office/drawing/2014/main" id="{17867632-75F7-4A56-8DD8-F63832551B87}"/>
+              </a:ext>
+            </a:extLst>
+          </p:cNvPr>
+          <p:cNvSpPr>
+            <a:spLocks noGrp="1"/>
+          </p:cNvSpPr>
+          <p:nvPr>
+            <p:ph type="body" idx="1"/>
+          </p:nvPr>
+        </p:nvSpPr>
+        <p:spPr/>
+        <p:txBody>
+          <a:bodyPr/>
+          <a:lstStyle/>
+          <a:p>
+            <a:endParaRPr lang="es-MX" dirty="0"/>
+          </a:p>
+        </p:txBody>
+      </p:sp>
+      <p:sp>
+        <p:nvSpPr>
+          <p:cNvPr id="4" name="Título 1">
+            <a:extLst>
+              <a:ext uri="{FF2B5EF4-FFF2-40B4-BE49-F238E27FC236}">
+                <a16:creationId xmlns:a16="http://schemas.microsoft.com/office/drawing/2014/main" id="{4C5F1AFD-8196-4EE9-9DD6-FC57413D247C}"/>
               </a:ext>
             </a:extLst>
           </p:cNvPr>
@@ -8386,8 +8191,8 @@
         </p:nvSpPr>
         <p:spPr>
           <a:xfrm>
-            <a:off x="1073700" y="81821"/>
-            <a:ext cx="6996600" cy="715800"/>
+            <a:off x="663529" y="0"/>
+            <a:ext cx="7816941" cy="1576963"/>
           </a:xfrm>
         </p:spPr>
         <p:txBody>
@@ -8401,7 +8206,7 @@
                 </a:solidFill>
                 <a:latin typeface="Yanone Kaffeesatz" panose="020B0604020202020204" charset="0"/>
               </a:rPr>
-              <a:t>R</a:t>
+              <a:t>P</a:t>
             </a:r>
             <a:r>
               <a:rPr lang="es-MX" sz="4400" dirty="0">
@@ -8410,206 +8215,12 @@
                 </a:solidFill>
                 <a:latin typeface="Yanone Kaffeesatz" panose="020B0604020202020204" charset="0"/>
               </a:rPr>
-              <a:t>equerimientos</a:t>
+              <a:t>resentación de pruebas iniciales de usabilidad</a:t>
             </a:r>
-          </a:p>
-        </p:txBody>
-      </p:sp>
-      <p:sp>
-        <p:nvSpPr>
-          <p:cNvPr id="8" name="CuadroTexto 7">
-            <a:extLst>
-              <a:ext uri="{FF2B5EF4-FFF2-40B4-BE49-F238E27FC236}">
-                <a16:creationId xmlns:a16="http://schemas.microsoft.com/office/drawing/2014/main" id="{1FBDA049-ECFF-444B-91CC-643DF9FF8024}"/>
-              </a:ext>
-            </a:extLst>
-          </p:cNvPr>
-          <p:cNvSpPr txBox="1"/>
-          <p:nvPr/>
-        </p:nvSpPr>
-        <p:spPr>
-          <a:xfrm>
-            <a:off x="261257" y="512466"/>
-            <a:ext cx="2491986" cy="553998"/>
-          </a:xfrm>
-          <a:prstGeom prst="rect">
-            <a:avLst/>
-          </a:prstGeom>
-          <a:noFill/>
-        </p:spPr>
-        <p:txBody>
-          <a:bodyPr wrap="square" rtlCol="0">
-            <a:spAutoFit/>
-          </a:bodyPr>
-          <a:lstStyle/>
-          <a:p>
-            <a:r>
-              <a:rPr lang="es-MX" sz="3000" dirty="0">
-                <a:solidFill>
-                  <a:srgbClr val="1155CC"/>
-                </a:solidFill>
-                <a:latin typeface="Yanone Kaffeesatz" panose="020B0604020202020204" charset="0"/>
-              </a:rPr>
-              <a:t>F</a:t>
-            </a:r>
-            <a:r>
-              <a:rPr lang="es-MX" sz="3000" dirty="0">
-                <a:latin typeface="Yanone Kaffeesatz" panose="020B0604020202020204" charset="0"/>
-              </a:rPr>
-              <a:t>uncionales</a:t>
-            </a:r>
-          </a:p>
-        </p:txBody>
-      </p:sp>
-      <p:pic>
-        <p:nvPicPr>
-          <p:cNvPr id="12" name="Imagen 11" descr="Imagen que contiene colorido&#10;&#10;Descripción generada automáticamente">
-            <a:extLst>
-              <a:ext uri="{FF2B5EF4-FFF2-40B4-BE49-F238E27FC236}">
-                <a16:creationId xmlns:a16="http://schemas.microsoft.com/office/drawing/2014/main" id="{F9CC73FC-A3BF-463E-881D-706B694A03E2}"/>
-              </a:ext>
-            </a:extLst>
-          </p:cNvPr>
-          <p:cNvPicPr>
-            <a:picLocks noChangeAspect="1"/>
-          </p:cNvPicPr>
-          <p:nvPr/>
-        </p:nvPicPr>
-        <p:blipFill>
-          <a:blip r:embed="rId2"/>
-          <a:stretch>
-            <a:fillRect/>
-          </a:stretch>
-        </p:blipFill>
-        <p:spPr>
-          <a:xfrm>
-            <a:off x="3209538" y="789465"/>
-            <a:ext cx="3818584" cy="3686842"/>
-          </a:xfrm>
-          <a:prstGeom prst="rect">
-            <a:avLst/>
-          </a:prstGeom>
-        </p:spPr>
-      </p:pic>
-      <p:sp>
-        <p:nvSpPr>
-          <p:cNvPr id="13" name="Marcador de texto 2">
-            <a:extLst>
-              <a:ext uri="{FF2B5EF4-FFF2-40B4-BE49-F238E27FC236}">
-                <a16:creationId xmlns:a16="http://schemas.microsoft.com/office/drawing/2014/main" id="{6065E060-16D2-4B88-8BE8-ABFA1A4BE7CB}"/>
-              </a:ext>
-            </a:extLst>
-          </p:cNvPr>
-          <p:cNvSpPr>
-            <a:spLocks noGrp="1"/>
-          </p:cNvSpPr>
-          <p:nvPr>
-            <p:ph type="body" idx="1"/>
-          </p:nvPr>
-        </p:nvSpPr>
-        <p:spPr>
-          <a:xfrm>
-            <a:off x="71039" y="1066464"/>
-            <a:ext cx="3138499" cy="1922100"/>
-          </a:xfrm>
-        </p:spPr>
-        <p:txBody>
-          <a:bodyPr/>
-          <a:lstStyle/>
-          <a:p>
-            <a:r>
-              <a:rPr lang="es-MX" dirty="0">
-                <a:solidFill>
-                  <a:schemeClr val="tx1"/>
-                </a:solidFill>
-                <a:latin typeface="Yanone Kaffeesatz" panose="020B0604020202020204" charset="0"/>
-              </a:rPr>
-              <a:t>Test de personalidad</a:t>
-            </a:r>
-          </a:p>
-          <a:p>
-            <a:r>
-              <a:rPr lang="es-MX" dirty="0">
-                <a:solidFill>
-                  <a:schemeClr val="tx1"/>
-                </a:solidFill>
-                <a:latin typeface="Yanone Kaffeesatz" panose="020B0604020202020204" charset="0"/>
-              </a:rPr>
-              <a:t>Gustos de Facebook</a:t>
-            </a:r>
-          </a:p>
-          <a:p>
-            <a:r>
-              <a:rPr lang="es-MX" dirty="0">
-                <a:solidFill>
-                  <a:schemeClr val="tx1"/>
-                </a:solidFill>
-                <a:latin typeface="Yanone Kaffeesatz" panose="020B0604020202020204" charset="0"/>
-              </a:rPr>
-              <a:t>Notificaciones </a:t>
-            </a:r>
-            <a:r>
-              <a:rPr lang="es-MX" dirty="0" err="1">
-                <a:solidFill>
-                  <a:schemeClr val="tx1"/>
-                </a:solidFill>
-                <a:latin typeface="Yanone Kaffeesatz" panose="020B0604020202020204" charset="0"/>
-              </a:rPr>
-              <a:t>push</a:t>
-            </a:r>
-            <a:endParaRPr lang="es-MX" dirty="0">
-              <a:solidFill>
-                <a:schemeClr val="tx1"/>
-              </a:solidFill>
-              <a:latin typeface="Yanone Kaffeesatz" panose="020B0604020202020204" charset="0"/>
-            </a:endParaRPr>
-          </a:p>
-          <a:p>
-            <a:r>
-              <a:rPr lang="es-MX" dirty="0">
-                <a:solidFill>
-                  <a:schemeClr val="tx1"/>
-                </a:solidFill>
-                <a:latin typeface="Yanone Kaffeesatz" panose="020B0604020202020204" charset="0"/>
-              </a:rPr>
-              <a:t>Recomendación</a:t>
-            </a:r>
-          </a:p>
-          <a:p>
-            <a:r>
-              <a:rPr lang="es-MX" dirty="0">
-                <a:solidFill>
-                  <a:schemeClr val="tx1"/>
-                </a:solidFill>
-                <a:latin typeface="Yanone Kaffeesatz" panose="020B0604020202020204" charset="0"/>
-              </a:rPr>
-              <a:t>Recompensas</a:t>
-            </a:r>
-          </a:p>
-          <a:p>
-            <a:r>
-              <a:rPr lang="es-MX" dirty="0">
-                <a:solidFill>
-                  <a:schemeClr val="tx1"/>
-                </a:solidFill>
-                <a:latin typeface="Yanone Kaffeesatz" panose="020B0604020202020204" charset="0"/>
-              </a:rPr>
-              <a:t>Algoritmo de recomendación de amistades</a:t>
-            </a:r>
-          </a:p>
-          <a:p>
-            <a:r>
-              <a:rPr lang="es-MX" dirty="0">
-                <a:solidFill>
-                  <a:schemeClr val="tx1"/>
-                </a:solidFill>
-                <a:latin typeface="Yanone Kaffeesatz" panose="020B0604020202020204" charset="0"/>
-              </a:rPr>
-              <a:t>Gestión de actividades/amistades</a:t>
-            </a:r>
-          </a:p>
-          <a:p>
-            <a:endParaRPr lang="es-MX" dirty="0">
+            <a:br>
+              <a:rPr lang="es-MX" sz="4400" dirty="0"/>
+            </a:br>
+            <a:endParaRPr lang="es-MX" sz="4400" dirty="0">
               <a:solidFill>
                 <a:schemeClr val="tx1"/>
               </a:solidFill>
@@ -8618,983 +8229,16 @@
           </a:p>
         </p:txBody>
       </p:sp>
-      <p:sp>
-        <p:nvSpPr>
-          <p:cNvPr id="14" name="CuadroTexto 13">
-            <a:extLst>
-              <a:ext uri="{FF2B5EF4-FFF2-40B4-BE49-F238E27FC236}">
-                <a16:creationId xmlns:a16="http://schemas.microsoft.com/office/drawing/2014/main" id="{2421EE56-296A-42A0-9797-82B490DE4DB8}"/>
-              </a:ext>
-            </a:extLst>
-          </p:cNvPr>
-          <p:cNvSpPr txBox="1"/>
-          <p:nvPr/>
-        </p:nvSpPr>
-        <p:spPr>
-          <a:xfrm>
-            <a:off x="6131509" y="520622"/>
-            <a:ext cx="2491986" cy="553998"/>
-          </a:xfrm>
-          <a:prstGeom prst="rect">
-            <a:avLst/>
-          </a:prstGeom>
-          <a:noFill/>
-        </p:spPr>
-        <p:txBody>
-          <a:bodyPr wrap="square" rtlCol="0">
-            <a:spAutoFit/>
-          </a:bodyPr>
-          <a:lstStyle/>
-          <a:p>
-            <a:r>
-              <a:rPr lang="es-MX" sz="3000" dirty="0">
-                <a:solidFill>
-                  <a:srgbClr val="1155CC"/>
-                </a:solidFill>
-                <a:latin typeface="Yanone Kaffeesatz" panose="020B0604020202020204" charset="0"/>
-              </a:rPr>
-              <a:t>N</a:t>
-            </a:r>
-            <a:r>
-              <a:rPr lang="es-MX" sz="3000" dirty="0">
-                <a:solidFill>
-                  <a:schemeClr val="tx1"/>
-                </a:solidFill>
-                <a:latin typeface="Yanone Kaffeesatz" panose="020B0604020202020204" charset="0"/>
-              </a:rPr>
-              <a:t>o-</a:t>
-            </a:r>
-            <a:r>
-              <a:rPr lang="es-MX" sz="3000" dirty="0">
-                <a:solidFill>
-                  <a:srgbClr val="1155CC"/>
-                </a:solidFill>
-                <a:latin typeface="Yanone Kaffeesatz" panose="020B0604020202020204" charset="0"/>
-              </a:rPr>
-              <a:t>F</a:t>
-            </a:r>
-            <a:r>
-              <a:rPr lang="es-MX" sz="3000" dirty="0">
-                <a:latin typeface="Yanone Kaffeesatz" panose="020B0604020202020204" charset="0"/>
-              </a:rPr>
-              <a:t>uncionales</a:t>
-            </a:r>
-          </a:p>
-        </p:txBody>
-      </p:sp>
-      <p:sp>
-        <p:nvSpPr>
-          <p:cNvPr id="15" name="Marcador de texto 2">
-            <a:extLst>
-              <a:ext uri="{FF2B5EF4-FFF2-40B4-BE49-F238E27FC236}">
-                <a16:creationId xmlns:a16="http://schemas.microsoft.com/office/drawing/2014/main" id="{73D53BF7-7990-4AB8-8B5F-E3BF586455BD}"/>
-              </a:ext>
-            </a:extLst>
-          </p:cNvPr>
-          <p:cNvSpPr txBox="1">
-            <a:spLocks/>
-          </p:cNvSpPr>
-          <p:nvPr/>
-        </p:nvSpPr>
-        <p:spPr>
-          <a:xfrm>
-            <a:off x="5979961" y="1066463"/>
-            <a:ext cx="3138500" cy="2569871"/>
-          </a:xfrm>
-          <a:prstGeom prst="rect">
-            <a:avLst/>
-          </a:prstGeom>
-          <a:noFill/>
-          <a:ln>
-            <a:noFill/>
-          </a:ln>
-        </p:spPr>
-        <p:txBody>
-          <a:bodyPr spcFirstLastPara="1" wrap="square" lIns="91425" tIns="91425" rIns="91425" bIns="91425" anchor="t" anchorCtr="0"/>
-          <a:lstStyle>
-            <a:defPPr marR="0" lvl="0" algn="l" rtl="0">
-              <a:lnSpc>
-                <a:spcPct val="100000"/>
-              </a:lnSpc>
-              <a:spcBef>
-                <a:spcPts val="0"/>
-              </a:spcBef>
-              <a:spcAft>
-                <a:spcPts val="0"/>
-              </a:spcAft>
-            </a:defPPr>
-            <a:lvl1pPr marL="457200" marR="0" lvl="0" indent="-355600" algn="l" rtl="0">
-              <a:lnSpc>
-                <a:spcPct val="100000"/>
-              </a:lnSpc>
-              <a:spcBef>
-                <a:spcPts val="600"/>
-              </a:spcBef>
-              <a:spcAft>
-                <a:spcPts val="0"/>
-              </a:spcAft>
-              <a:buClr>
-                <a:srgbClr val="28324A"/>
-              </a:buClr>
-              <a:buSzPts val="2000"/>
-              <a:buFont typeface="Source Sans Pro"/>
-              <a:buChar char="◉"/>
-              <a:defRPr sz="2000" b="0" i="0" u="none" strike="noStrike" cap="none">
-                <a:solidFill>
-                  <a:srgbClr val="28324A"/>
-                </a:solidFill>
-                <a:latin typeface="Source Sans Pro"/>
-                <a:ea typeface="Source Sans Pro"/>
-                <a:cs typeface="Source Sans Pro"/>
-                <a:sym typeface="Source Sans Pro"/>
-              </a:defRPr>
-            </a:lvl1pPr>
-            <a:lvl2pPr marL="914400" marR="0" lvl="1" indent="-342900" algn="l" rtl="0">
-              <a:lnSpc>
-                <a:spcPct val="100000"/>
-              </a:lnSpc>
-              <a:spcBef>
-                <a:spcPts val="0"/>
-              </a:spcBef>
-              <a:spcAft>
-                <a:spcPts val="0"/>
-              </a:spcAft>
-              <a:buClr>
-                <a:srgbClr val="28324A"/>
-              </a:buClr>
-              <a:buSzPts val="1800"/>
-              <a:buFont typeface="Source Sans Pro"/>
-              <a:buChar char="◉"/>
-              <a:defRPr sz="1800" b="0" i="0" u="none" strike="noStrike" cap="none">
-                <a:solidFill>
-                  <a:srgbClr val="28324A"/>
-                </a:solidFill>
-                <a:latin typeface="Source Sans Pro"/>
-                <a:ea typeface="Source Sans Pro"/>
-                <a:cs typeface="Source Sans Pro"/>
-                <a:sym typeface="Source Sans Pro"/>
-              </a:defRPr>
-            </a:lvl2pPr>
-            <a:lvl3pPr marL="1371600" marR="0" lvl="2" indent="-342900" algn="l" rtl="0">
-              <a:lnSpc>
-                <a:spcPct val="100000"/>
-              </a:lnSpc>
-              <a:spcBef>
-                <a:spcPts val="0"/>
-              </a:spcBef>
-              <a:spcAft>
-                <a:spcPts val="0"/>
-              </a:spcAft>
-              <a:buClr>
-                <a:srgbClr val="28324A"/>
-              </a:buClr>
-              <a:buSzPts val="1800"/>
-              <a:buFont typeface="Source Sans Pro"/>
-              <a:buChar char="■"/>
-              <a:defRPr sz="1800" b="0" i="0" u="none" strike="noStrike" cap="none">
-                <a:solidFill>
-                  <a:srgbClr val="28324A"/>
-                </a:solidFill>
-                <a:latin typeface="Source Sans Pro"/>
-                <a:ea typeface="Source Sans Pro"/>
-                <a:cs typeface="Source Sans Pro"/>
-                <a:sym typeface="Source Sans Pro"/>
-              </a:defRPr>
-            </a:lvl3pPr>
-            <a:lvl4pPr marL="1828800" marR="0" lvl="3" indent="-342900" algn="l" rtl="0">
-              <a:lnSpc>
-                <a:spcPct val="100000"/>
-              </a:lnSpc>
-              <a:spcBef>
-                <a:spcPts val="0"/>
-              </a:spcBef>
-              <a:spcAft>
-                <a:spcPts val="0"/>
-              </a:spcAft>
-              <a:buClr>
-                <a:srgbClr val="28324A"/>
-              </a:buClr>
-              <a:buSzPts val="1800"/>
-              <a:buFont typeface="Source Sans Pro"/>
-              <a:buChar char="●"/>
-              <a:defRPr sz="1800" b="0" i="0" u="none" strike="noStrike" cap="none">
-                <a:solidFill>
-                  <a:srgbClr val="28324A"/>
-                </a:solidFill>
-                <a:latin typeface="Source Sans Pro"/>
-                <a:ea typeface="Source Sans Pro"/>
-                <a:cs typeface="Source Sans Pro"/>
-                <a:sym typeface="Source Sans Pro"/>
-              </a:defRPr>
-            </a:lvl4pPr>
-            <a:lvl5pPr marL="2286000" marR="0" lvl="4" indent="-342900" algn="l" rtl="0">
-              <a:lnSpc>
-                <a:spcPct val="100000"/>
-              </a:lnSpc>
-              <a:spcBef>
-                <a:spcPts val="0"/>
-              </a:spcBef>
-              <a:spcAft>
-                <a:spcPts val="0"/>
-              </a:spcAft>
-              <a:buClr>
-                <a:srgbClr val="28324A"/>
-              </a:buClr>
-              <a:buSzPts val="1800"/>
-              <a:buFont typeface="Source Sans Pro"/>
-              <a:buChar char="○"/>
-              <a:defRPr sz="1800" b="0" i="0" u="none" strike="noStrike" cap="none">
-                <a:solidFill>
-                  <a:srgbClr val="28324A"/>
-                </a:solidFill>
-                <a:latin typeface="Source Sans Pro"/>
-                <a:ea typeface="Source Sans Pro"/>
-                <a:cs typeface="Source Sans Pro"/>
-                <a:sym typeface="Source Sans Pro"/>
-              </a:defRPr>
-            </a:lvl5pPr>
-            <a:lvl6pPr marL="2743200" marR="0" lvl="5" indent="-342900" algn="l" rtl="0">
-              <a:lnSpc>
-                <a:spcPct val="100000"/>
-              </a:lnSpc>
-              <a:spcBef>
-                <a:spcPts val="0"/>
-              </a:spcBef>
-              <a:spcAft>
-                <a:spcPts val="0"/>
-              </a:spcAft>
-              <a:buClr>
-                <a:srgbClr val="28324A"/>
-              </a:buClr>
-              <a:buSzPts val="1800"/>
-              <a:buFont typeface="Source Sans Pro"/>
-              <a:buChar char="■"/>
-              <a:defRPr sz="1800" b="0" i="0" u="none" strike="noStrike" cap="none">
-                <a:solidFill>
-                  <a:srgbClr val="28324A"/>
-                </a:solidFill>
-                <a:latin typeface="Source Sans Pro"/>
-                <a:ea typeface="Source Sans Pro"/>
-                <a:cs typeface="Source Sans Pro"/>
-                <a:sym typeface="Source Sans Pro"/>
-              </a:defRPr>
-            </a:lvl6pPr>
-            <a:lvl7pPr marL="3200400" marR="0" lvl="6" indent="-342900" algn="l" rtl="0">
-              <a:lnSpc>
-                <a:spcPct val="100000"/>
-              </a:lnSpc>
-              <a:spcBef>
-                <a:spcPts val="0"/>
-              </a:spcBef>
-              <a:spcAft>
-                <a:spcPts val="0"/>
-              </a:spcAft>
-              <a:buClr>
-                <a:srgbClr val="28324A"/>
-              </a:buClr>
-              <a:buSzPts val="1800"/>
-              <a:buFont typeface="Source Sans Pro"/>
-              <a:buChar char="●"/>
-              <a:defRPr sz="1800" b="0" i="0" u="none" strike="noStrike" cap="none">
-                <a:solidFill>
-                  <a:srgbClr val="28324A"/>
-                </a:solidFill>
-                <a:latin typeface="Source Sans Pro"/>
-                <a:ea typeface="Source Sans Pro"/>
-                <a:cs typeface="Source Sans Pro"/>
-                <a:sym typeface="Source Sans Pro"/>
-              </a:defRPr>
-            </a:lvl7pPr>
-            <a:lvl8pPr marL="3657600" marR="0" lvl="7" indent="-342900" algn="l" rtl="0">
-              <a:lnSpc>
-                <a:spcPct val="100000"/>
-              </a:lnSpc>
-              <a:spcBef>
-                <a:spcPts val="0"/>
-              </a:spcBef>
-              <a:spcAft>
-                <a:spcPts val="0"/>
-              </a:spcAft>
-              <a:buClr>
-                <a:srgbClr val="28324A"/>
-              </a:buClr>
-              <a:buSzPts val="1800"/>
-              <a:buFont typeface="Source Sans Pro"/>
-              <a:buChar char="○"/>
-              <a:defRPr sz="1800" b="0" i="0" u="none" strike="noStrike" cap="none">
-                <a:solidFill>
-                  <a:srgbClr val="28324A"/>
-                </a:solidFill>
-                <a:latin typeface="Source Sans Pro"/>
-                <a:ea typeface="Source Sans Pro"/>
-                <a:cs typeface="Source Sans Pro"/>
-                <a:sym typeface="Source Sans Pro"/>
-              </a:defRPr>
-            </a:lvl8pPr>
-            <a:lvl9pPr marL="4114800" marR="0" lvl="8" indent="-342900" algn="l" rtl="0">
-              <a:lnSpc>
-                <a:spcPct val="100000"/>
-              </a:lnSpc>
-              <a:spcBef>
-                <a:spcPts val="0"/>
-              </a:spcBef>
-              <a:spcAft>
-                <a:spcPts val="0"/>
-              </a:spcAft>
-              <a:buClr>
-                <a:srgbClr val="28324A"/>
-              </a:buClr>
-              <a:buSzPts val="1800"/>
-              <a:buFont typeface="Source Sans Pro"/>
-              <a:buChar char="■"/>
-              <a:defRPr sz="1800" b="0" i="0" u="none" strike="noStrike" cap="none">
-                <a:solidFill>
-                  <a:srgbClr val="28324A"/>
-                </a:solidFill>
-                <a:latin typeface="Source Sans Pro"/>
-                <a:ea typeface="Source Sans Pro"/>
-                <a:cs typeface="Source Sans Pro"/>
-                <a:sym typeface="Source Sans Pro"/>
-              </a:defRPr>
-            </a:lvl9pPr>
-          </a:lstStyle>
-          <a:p>
-            <a:r>
-              <a:rPr lang="es-MX" dirty="0">
-                <a:solidFill>
-                  <a:schemeClr val="tx1"/>
-                </a:solidFill>
-                <a:latin typeface="Yanone Kaffeesatz" panose="020B0604020202020204" charset="0"/>
-              </a:rPr>
-              <a:t>Poca dependencia de usuario</a:t>
-            </a:r>
-          </a:p>
-          <a:p>
-            <a:r>
-              <a:rPr lang="es-MX" dirty="0">
-                <a:solidFill>
-                  <a:schemeClr val="tx1"/>
-                </a:solidFill>
-                <a:latin typeface="Yanone Kaffeesatz" panose="020B0604020202020204" charset="0"/>
-              </a:rPr>
-              <a:t>Fácil de usar</a:t>
-            </a:r>
-          </a:p>
-          <a:p>
-            <a:r>
-              <a:rPr lang="es-MX" dirty="0">
-                <a:solidFill>
-                  <a:schemeClr val="tx1"/>
-                </a:solidFill>
-                <a:latin typeface="Yanone Kaffeesatz" panose="020B0604020202020204" charset="0"/>
-              </a:rPr>
-              <a:t>Poco invasivo</a:t>
-            </a:r>
-          </a:p>
-          <a:p>
-            <a:r>
-              <a:rPr lang="es-MX" dirty="0">
-                <a:solidFill>
-                  <a:schemeClr val="tx1"/>
-                </a:solidFill>
-                <a:latin typeface="Yanone Kaffeesatz" panose="020B0604020202020204" charset="0"/>
-              </a:rPr>
-              <a:t>Seguro</a:t>
-            </a:r>
-          </a:p>
-          <a:p>
-            <a:r>
-              <a:rPr lang="es-MX" dirty="0">
-                <a:solidFill>
-                  <a:schemeClr val="tx1"/>
-                </a:solidFill>
-                <a:latin typeface="Yanone Kaffeesatz" panose="020B0604020202020204" charset="0"/>
-              </a:rPr>
-              <a:t>Personal</a:t>
-            </a:r>
-          </a:p>
-          <a:p>
-            <a:r>
-              <a:rPr lang="es-MX" dirty="0">
-                <a:solidFill>
-                  <a:schemeClr val="tx1"/>
-                </a:solidFill>
-                <a:latin typeface="Yanone Kaffeesatz" panose="020B0604020202020204" charset="0"/>
-              </a:rPr>
-              <a:t>Rapidez</a:t>
-            </a:r>
-          </a:p>
-        </p:txBody>
-      </p:sp>
     </p:spTree>
     <p:extLst>
       <p:ext uri="{BB962C8B-B14F-4D97-AF65-F5344CB8AC3E}">
-        <p14:creationId xmlns:p14="http://schemas.microsoft.com/office/powerpoint/2010/main" val="2779586770"/>
+        <p14:creationId xmlns:p14="http://schemas.microsoft.com/office/powerpoint/2010/main" val="2891273861"/>
       </p:ext>
     </p:extLst>
   </p:cSld>
   <p:clrMapOvr>
     <a:masterClrMapping/>
   </p:clrMapOvr>
-  <p:timing>
-    <p:tnLst>
-      <p:par>
-        <p:cTn id="1" dur="indefinite" restart="never" nodeType="tmRoot">
-          <p:childTnLst>
-            <p:seq concurrent="1" nextAc="seek">
-              <p:cTn id="2" dur="indefinite" nodeType="mainSeq">
-                <p:childTnLst>
-                  <p:par>
-                    <p:cTn id="3" fill="hold">
-                      <p:stCondLst>
-                        <p:cond delay="indefinite"/>
-                      </p:stCondLst>
-                      <p:childTnLst>
-                        <p:par>
-                          <p:cTn id="4" fill="hold">
-                            <p:stCondLst>
-                              <p:cond delay="0"/>
-                            </p:stCondLst>
-                            <p:childTnLst>
-                              <p:par>
-                                <p:cTn id="5" presetID="1" presetClass="entr" presetSubtype="0" fill="hold" nodeType="clickEffect">
-                                  <p:stCondLst>
-                                    <p:cond delay="0"/>
-                                  </p:stCondLst>
-                                  <p:childTnLst>
-                                    <p:set>
-                                      <p:cBhvr>
-                                        <p:cTn id="6" dur="1" fill="hold">
-                                          <p:stCondLst>
-                                            <p:cond delay="0"/>
-                                          </p:stCondLst>
-                                        </p:cTn>
-                                        <p:tgtEl>
-                                          <p:spTgt spid="12"/>
-                                        </p:tgtEl>
-                                        <p:attrNameLst>
-                                          <p:attrName>style.visibility</p:attrName>
-                                        </p:attrNameLst>
-                                      </p:cBhvr>
-                                      <p:to>
-                                        <p:strVal val="visible"/>
-                                      </p:to>
-                                    </p:set>
-                                  </p:childTnLst>
-                                </p:cTn>
-                              </p:par>
-                            </p:childTnLst>
-                          </p:cTn>
-                        </p:par>
-                      </p:childTnLst>
-                    </p:cTn>
-                  </p:par>
-                  <p:par>
-                    <p:cTn id="7" fill="hold">
-                      <p:stCondLst>
-                        <p:cond delay="indefinite"/>
-                      </p:stCondLst>
-                      <p:childTnLst>
-                        <p:par>
-                          <p:cTn id="8" fill="hold">
-                            <p:stCondLst>
-                              <p:cond delay="0"/>
-                            </p:stCondLst>
-                            <p:childTnLst>
-                              <p:par>
-                                <p:cTn id="9" presetID="1" presetClass="entr" presetSubtype="0" fill="hold" grpId="0" nodeType="clickEffect">
-                                  <p:stCondLst>
-                                    <p:cond delay="0"/>
-                                  </p:stCondLst>
-                                  <p:childTnLst>
-                                    <p:set>
-                                      <p:cBhvr>
-                                        <p:cTn id="10" dur="1" fill="hold">
-                                          <p:stCondLst>
-                                            <p:cond delay="0"/>
-                                          </p:stCondLst>
-                                        </p:cTn>
-                                        <p:tgtEl>
-                                          <p:spTgt spid="8"/>
-                                        </p:tgtEl>
-                                        <p:attrNameLst>
-                                          <p:attrName>style.visibility</p:attrName>
-                                        </p:attrNameLst>
-                                      </p:cBhvr>
-                                      <p:to>
-                                        <p:strVal val="visible"/>
-                                      </p:to>
-                                    </p:set>
-                                  </p:childTnLst>
-                                </p:cTn>
-                              </p:par>
-                            </p:childTnLst>
-                          </p:cTn>
-                        </p:par>
-                      </p:childTnLst>
-                    </p:cTn>
-                  </p:par>
-                  <p:par>
-                    <p:cTn id="11" fill="hold">
-                      <p:stCondLst>
-                        <p:cond delay="indefinite"/>
-                      </p:stCondLst>
-                      <p:childTnLst>
-                        <p:par>
-                          <p:cTn id="12" fill="hold">
-                            <p:stCondLst>
-                              <p:cond delay="0"/>
-                            </p:stCondLst>
-                            <p:childTnLst>
-                              <p:par>
-                                <p:cTn id="13" presetID="1" presetClass="entr" presetSubtype="0" fill="hold" grpId="0" nodeType="clickEffect">
-                                  <p:stCondLst>
-                                    <p:cond delay="0"/>
-                                  </p:stCondLst>
-                                  <p:childTnLst>
-                                    <p:set>
-                                      <p:cBhvr>
-                                        <p:cTn id="14" dur="1" fill="hold">
-                                          <p:stCondLst>
-                                            <p:cond delay="0"/>
-                                          </p:stCondLst>
-                                        </p:cTn>
-                                        <p:tgtEl>
-                                          <p:spTgt spid="13">
-                                            <p:txEl>
-                                              <p:pRg st="0" end="0"/>
-                                            </p:txEl>
-                                          </p:spTgt>
-                                        </p:tgtEl>
-                                        <p:attrNameLst>
-                                          <p:attrName>style.visibility</p:attrName>
-                                        </p:attrNameLst>
-                                      </p:cBhvr>
-                                      <p:to>
-                                        <p:strVal val="visible"/>
-                                      </p:to>
-                                    </p:set>
-                                  </p:childTnLst>
-                                </p:cTn>
-                              </p:par>
-                            </p:childTnLst>
-                          </p:cTn>
-                        </p:par>
-                      </p:childTnLst>
-                    </p:cTn>
-                  </p:par>
-                  <p:par>
-                    <p:cTn id="15" fill="hold">
-                      <p:stCondLst>
-                        <p:cond delay="indefinite"/>
-                      </p:stCondLst>
-                      <p:childTnLst>
-                        <p:par>
-                          <p:cTn id="16" fill="hold">
-                            <p:stCondLst>
-                              <p:cond delay="0"/>
-                            </p:stCondLst>
-                            <p:childTnLst>
-                              <p:par>
-                                <p:cTn id="17" presetID="1" presetClass="entr" presetSubtype="0" fill="hold" grpId="0" nodeType="clickEffect">
-                                  <p:stCondLst>
-                                    <p:cond delay="0"/>
-                                  </p:stCondLst>
-                                  <p:childTnLst>
-                                    <p:set>
-                                      <p:cBhvr>
-                                        <p:cTn id="18" dur="1" fill="hold">
-                                          <p:stCondLst>
-                                            <p:cond delay="0"/>
-                                          </p:stCondLst>
-                                        </p:cTn>
-                                        <p:tgtEl>
-                                          <p:spTgt spid="13">
-                                            <p:txEl>
-                                              <p:pRg st="1" end="1"/>
-                                            </p:txEl>
-                                          </p:spTgt>
-                                        </p:tgtEl>
-                                        <p:attrNameLst>
-                                          <p:attrName>style.visibility</p:attrName>
-                                        </p:attrNameLst>
-                                      </p:cBhvr>
-                                      <p:to>
-                                        <p:strVal val="visible"/>
-                                      </p:to>
-                                    </p:set>
-                                  </p:childTnLst>
-                                </p:cTn>
-                              </p:par>
-                            </p:childTnLst>
-                          </p:cTn>
-                        </p:par>
-                      </p:childTnLst>
-                    </p:cTn>
-                  </p:par>
-                  <p:par>
-                    <p:cTn id="19" fill="hold">
-                      <p:stCondLst>
-                        <p:cond delay="indefinite"/>
-                      </p:stCondLst>
-                      <p:childTnLst>
-                        <p:par>
-                          <p:cTn id="20" fill="hold">
-                            <p:stCondLst>
-                              <p:cond delay="0"/>
-                            </p:stCondLst>
-                            <p:childTnLst>
-                              <p:par>
-                                <p:cTn id="21" presetID="1" presetClass="entr" presetSubtype="0" fill="hold" grpId="0" nodeType="clickEffect">
-                                  <p:stCondLst>
-                                    <p:cond delay="0"/>
-                                  </p:stCondLst>
-                                  <p:childTnLst>
-                                    <p:set>
-                                      <p:cBhvr>
-                                        <p:cTn id="22" dur="1" fill="hold">
-                                          <p:stCondLst>
-                                            <p:cond delay="0"/>
-                                          </p:stCondLst>
-                                        </p:cTn>
-                                        <p:tgtEl>
-                                          <p:spTgt spid="13">
-                                            <p:txEl>
-                                              <p:pRg st="2" end="2"/>
-                                            </p:txEl>
-                                          </p:spTgt>
-                                        </p:tgtEl>
-                                        <p:attrNameLst>
-                                          <p:attrName>style.visibility</p:attrName>
-                                        </p:attrNameLst>
-                                      </p:cBhvr>
-                                      <p:to>
-                                        <p:strVal val="visible"/>
-                                      </p:to>
-                                    </p:set>
-                                  </p:childTnLst>
-                                </p:cTn>
-                              </p:par>
-                            </p:childTnLst>
-                          </p:cTn>
-                        </p:par>
-                      </p:childTnLst>
-                    </p:cTn>
-                  </p:par>
-                  <p:par>
-                    <p:cTn id="23" fill="hold">
-                      <p:stCondLst>
-                        <p:cond delay="indefinite"/>
-                      </p:stCondLst>
-                      <p:childTnLst>
-                        <p:par>
-                          <p:cTn id="24" fill="hold">
-                            <p:stCondLst>
-                              <p:cond delay="0"/>
-                            </p:stCondLst>
-                            <p:childTnLst>
-                              <p:par>
-                                <p:cTn id="25" presetID="1" presetClass="entr" presetSubtype="0" fill="hold" grpId="0" nodeType="clickEffect">
-                                  <p:stCondLst>
-                                    <p:cond delay="0"/>
-                                  </p:stCondLst>
-                                  <p:childTnLst>
-                                    <p:set>
-                                      <p:cBhvr>
-                                        <p:cTn id="26" dur="1" fill="hold">
-                                          <p:stCondLst>
-                                            <p:cond delay="0"/>
-                                          </p:stCondLst>
-                                        </p:cTn>
-                                        <p:tgtEl>
-                                          <p:spTgt spid="13">
-                                            <p:txEl>
-                                              <p:pRg st="3" end="3"/>
-                                            </p:txEl>
-                                          </p:spTgt>
-                                        </p:tgtEl>
-                                        <p:attrNameLst>
-                                          <p:attrName>style.visibility</p:attrName>
-                                        </p:attrNameLst>
-                                      </p:cBhvr>
-                                      <p:to>
-                                        <p:strVal val="visible"/>
-                                      </p:to>
-                                    </p:set>
-                                  </p:childTnLst>
-                                </p:cTn>
-                              </p:par>
-                            </p:childTnLst>
-                          </p:cTn>
-                        </p:par>
-                      </p:childTnLst>
-                    </p:cTn>
-                  </p:par>
-                  <p:par>
-                    <p:cTn id="27" fill="hold">
-                      <p:stCondLst>
-                        <p:cond delay="indefinite"/>
-                      </p:stCondLst>
-                      <p:childTnLst>
-                        <p:par>
-                          <p:cTn id="28" fill="hold">
-                            <p:stCondLst>
-                              <p:cond delay="0"/>
-                            </p:stCondLst>
-                            <p:childTnLst>
-                              <p:par>
-                                <p:cTn id="29" presetID="1" presetClass="entr" presetSubtype="0" fill="hold" grpId="0" nodeType="clickEffect">
-                                  <p:stCondLst>
-                                    <p:cond delay="0"/>
-                                  </p:stCondLst>
-                                  <p:childTnLst>
-                                    <p:set>
-                                      <p:cBhvr>
-                                        <p:cTn id="30" dur="1" fill="hold">
-                                          <p:stCondLst>
-                                            <p:cond delay="0"/>
-                                          </p:stCondLst>
-                                        </p:cTn>
-                                        <p:tgtEl>
-                                          <p:spTgt spid="13">
-                                            <p:txEl>
-                                              <p:pRg st="4" end="4"/>
-                                            </p:txEl>
-                                          </p:spTgt>
-                                        </p:tgtEl>
-                                        <p:attrNameLst>
-                                          <p:attrName>style.visibility</p:attrName>
-                                        </p:attrNameLst>
-                                      </p:cBhvr>
-                                      <p:to>
-                                        <p:strVal val="visible"/>
-                                      </p:to>
-                                    </p:set>
-                                  </p:childTnLst>
-                                </p:cTn>
-                              </p:par>
-                            </p:childTnLst>
-                          </p:cTn>
-                        </p:par>
-                      </p:childTnLst>
-                    </p:cTn>
-                  </p:par>
-                  <p:par>
-                    <p:cTn id="31" fill="hold">
-                      <p:stCondLst>
-                        <p:cond delay="indefinite"/>
-                      </p:stCondLst>
-                      <p:childTnLst>
-                        <p:par>
-                          <p:cTn id="32" fill="hold">
-                            <p:stCondLst>
-                              <p:cond delay="0"/>
-                            </p:stCondLst>
-                            <p:childTnLst>
-                              <p:par>
-                                <p:cTn id="33" presetID="1" presetClass="entr" presetSubtype="0" fill="hold" grpId="0" nodeType="clickEffect">
-                                  <p:stCondLst>
-                                    <p:cond delay="0"/>
-                                  </p:stCondLst>
-                                  <p:childTnLst>
-                                    <p:set>
-                                      <p:cBhvr>
-                                        <p:cTn id="34" dur="1" fill="hold">
-                                          <p:stCondLst>
-                                            <p:cond delay="0"/>
-                                          </p:stCondLst>
-                                        </p:cTn>
-                                        <p:tgtEl>
-                                          <p:spTgt spid="13">
-                                            <p:txEl>
-                                              <p:pRg st="5" end="5"/>
-                                            </p:txEl>
-                                          </p:spTgt>
-                                        </p:tgtEl>
-                                        <p:attrNameLst>
-                                          <p:attrName>style.visibility</p:attrName>
-                                        </p:attrNameLst>
-                                      </p:cBhvr>
-                                      <p:to>
-                                        <p:strVal val="visible"/>
-                                      </p:to>
-                                    </p:set>
-                                  </p:childTnLst>
-                                </p:cTn>
-                              </p:par>
-                            </p:childTnLst>
-                          </p:cTn>
-                        </p:par>
-                      </p:childTnLst>
-                    </p:cTn>
-                  </p:par>
-                  <p:par>
-                    <p:cTn id="35" fill="hold">
-                      <p:stCondLst>
-                        <p:cond delay="indefinite"/>
-                      </p:stCondLst>
-                      <p:childTnLst>
-                        <p:par>
-                          <p:cTn id="36" fill="hold">
-                            <p:stCondLst>
-                              <p:cond delay="0"/>
-                            </p:stCondLst>
-                            <p:childTnLst>
-                              <p:par>
-                                <p:cTn id="37" presetID="1" presetClass="entr" presetSubtype="0" fill="hold" grpId="0" nodeType="clickEffect">
-                                  <p:stCondLst>
-                                    <p:cond delay="0"/>
-                                  </p:stCondLst>
-                                  <p:childTnLst>
-                                    <p:set>
-                                      <p:cBhvr>
-                                        <p:cTn id="38" dur="1" fill="hold">
-                                          <p:stCondLst>
-                                            <p:cond delay="0"/>
-                                          </p:stCondLst>
-                                        </p:cTn>
-                                        <p:tgtEl>
-                                          <p:spTgt spid="13">
-                                            <p:txEl>
-                                              <p:pRg st="6" end="6"/>
-                                            </p:txEl>
-                                          </p:spTgt>
-                                        </p:tgtEl>
-                                        <p:attrNameLst>
-                                          <p:attrName>style.visibility</p:attrName>
-                                        </p:attrNameLst>
-                                      </p:cBhvr>
-                                      <p:to>
-                                        <p:strVal val="visible"/>
-                                      </p:to>
-                                    </p:set>
-                                  </p:childTnLst>
-                                </p:cTn>
-                              </p:par>
-                            </p:childTnLst>
-                          </p:cTn>
-                        </p:par>
-                      </p:childTnLst>
-                    </p:cTn>
-                  </p:par>
-                  <p:par>
-                    <p:cTn id="39" fill="hold">
-                      <p:stCondLst>
-                        <p:cond delay="indefinite"/>
-                      </p:stCondLst>
-                      <p:childTnLst>
-                        <p:par>
-                          <p:cTn id="40" fill="hold">
-                            <p:stCondLst>
-                              <p:cond delay="0"/>
-                            </p:stCondLst>
-                            <p:childTnLst>
-                              <p:par>
-                                <p:cTn id="41" presetID="1" presetClass="entr" presetSubtype="0" fill="hold" grpId="0" nodeType="clickEffect">
-                                  <p:stCondLst>
-                                    <p:cond delay="0"/>
-                                  </p:stCondLst>
-                                  <p:childTnLst>
-                                    <p:set>
-                                      <p:cBhvr>
-                                        <p:cTn id="42" dur="1" fill="hold">
-                                          <p:stCondLst>
-                                            <p:cond delay="0"/>
-                                          </p:stCondLst>
-                                        </p:cTn>
-                                        <p:tgtEl>
-                                          <p:spTgt spid="14"/>
-                                        </p:tgtEl>
-                                        <p:attrNameLst>
-                                          <p:attrName>style.visibility</p:attrName>
-                                        </p:attrNameLst>
-                                      </p:cBhvr>
-                                      <p:to>
-                                        <p:strVal val="visible"/>
-                                      </p:to>
-                                    </p:set>
-                                  </p:childTnLst>
-                                </p:cTn>
-                              </p:par>
-                            </p:childTnLst>
-                          </p:cTn>
-                        </p:par>
-                      </p:childTnLst>
-                    </p:cTn>
-                  </p:par>
-                  <p:par>
-                    <p:cTn id="43" fill="hold">
-                      <p:stCondLst>
-                        <p:cond delay="indefinite"/>
-                      </p:stCondLst>
-                      <p:childTnLst>
-                        <p:par>
-                          <p:cTn id="44" fill="hold">
-                            <p:stCondLst>
-                              <p:cond delay="0"/>
-                            </p:stCondLst>
-                            <p:childTnLst>
-                              <p:par>
-                                <p:cTn id="45" presetID="1" presetClass="entr" presetSubtype="0" fill="hold" grpId="0" nodeType="clickEffect">
-                                  <p:stCondLst>
-                                    <p:cond delay="0"/>
-                                  </p:stCondLst>
-                                  <p:childTnLst>
-                                    <p:set>
-                                      <p:cBhvr>
-                                        <p:cTn id="46" dur="1" fill="hold">
-                                          <p:stCondLst>
-                                            <p:cond delay="0"/>
-                                          </p:stCondLst>
-                                        </p:cTn>
-                                        <p:tgtEl>
-                                          <p:spTgt spid="15"/>
-                                        </p:tgtEl>
-                                        <p:attrNameLst>
-                                          <p:attrName>style.visibility</p:attrName>
-                                        </p:attrNameLst>
-                                      </p:cBhvr>
-                                      <p:to>
-                                        <p:strVal val="visible"/>
-                                      </p:to>
-                                    </p:set>
-                                  </p:childTnLst>
-                                </p:cTn>
-                              </p:par>
-                            </p:childTnLst>
-                          </p:cTn>
-                        </p:par>
-                      </p:childTnLst>
-                    </p:cTn>
-                  </p:par>
-                </p:childTnLst>
-              </p:cTn>
-              <p:prevCondLst>
-                <p:cond evt="onPrev" delay="0">
-                  <p:tgtEl>
-                    <p:sldTgt/>
-                  </p:tgtEl>
-                </p:cond>
-              </p:prevCondLst>
-              <p:nextCondLst>
-                <p:cond evt="onNext" delay="0">
-                  <p:tgtEl>
-                    <p:sldTgt/>
-                  </p:tgtEl>
-                </p:cond>
-              </p:nextCondLst>
-            </p:seq>
-          </p:childTnLst>
-        </p:cTn>
-      </p:par>
-    </p:tnLst>
-    <p:bldLst>
-      <p:bldP spid="8" grpId="0"/>
-      <p:bldP spid="13" grpId="0" build="p"/>
-      <p:bldP spid="14" grpId="0"/>
-      <p:bldP spid="15" grpId="0"/>
-    </p:bldLst>
-  </p:timing>
 </p:sld>
 </file>
 

</xml_diff>

<commit_message>
Actualización de la presentación
Agregado la parte del plan de pruebas de usabilidad
</commit_message>
<xml_diff>
--- a/Segunda entrega/SegundaEntrega.pptx
+++ b/Segunda entrega/SegundaEntrega.pptx
@@ -22,19 +22,19 @@
   <p:notesSz cx="6858000" cy="9144000"/>
   <p:embeddedFontLst>
     <p:embeddedFont>
-      <p:font typeface="Oswald" panose="020B0604020202020204" charset="0"/>
+      <p:font typeface="Yanone Kaffeesatz" panose="020B0604020202020204" charset="0"/>
       <p:regular r:id="rId12"/>
       <p:bold r:id="rId13"/>
     </p:embeddedFont>
     <p:embeddedFont>
-      <p:font typeface="Source Sans Pro" panose="020B0503030403020204" pitchFamily="34" charset="0"/>
+      <p:font typeface="Source Sans Pro" panose="020B0604020202020204" charset="0"/>
       <p:regular r:id="rId14"/>
       <p:bold r:id="rId15"/>
       <p:italic r:id="rId16"/>
       <p:boldItalic r:id="rId17"/>
     </p:embeddedFont>
     <p:embeddedFont>
-      <p:font typeface="Yanone Kaffeesatz" panose="020B0604020202020204" charset="0"/>
+      <p:font typeface="Oswald" panose="020B0604020202020204" charset="0"/>
       <p:regular r:id="rId18"/>
       <p:bold r:id="rId19"/>
     </p:embeddedFont>
@@ -8164,11 +8164,86 @@
             <p:ph type="body" idx="1"/>
           </p:nvPr>
         </p:nvSpPr>
-        <p:spPr/>
+        <p:spPr>
+          <a:xfrm>
+            <a:off x="1075850" y="1540174"/>
+            <a:ext cx="6996600" cy="2648367"/>
+          </a:xfrm>
+        </p:spPr>
         <p:txBody>
           <a:bodyPr/>
           <a:lstStyle/>
           <a:p>
+            <a:r>
+              <a:rPr lang="es-MX" dirty="0" smtClean="0"/>
+              <a:t>Los participantes tiene la característica importante de querer cambiar. </a:t>
+            </a:r>
+          </a:p>
+          <a:p>
+            <a:r>
+              <a:rPr lang="es-MX" dirty="0" smtClean="0"/>
+              <a:t>Las pruebas iniciales de usabilidad tienen prioridad:</a:t>
+            </a:r>
+          </a:p>
+          <a:p>
+            <a:pPr lvl="1">
+              <a:buFont typeface="Wingdings" panose="05000000000000000000" pitchFamily="2" charset="2"/>
+              <a:buChar char="§"/>
+            </a:pPr>
+            <a:r>
+              <a:rPr lang="es-MX" dirty="0"/>
+              <a:t>E</a:t>
+            </a:r>
+            <a:r>
+              <a:rPr lang="es-MX" dirty="0" smtClean="0"/>
+              <a:t>n la eficiencia </a:t>
+            </a:r>
+            <a:r>
+              <a:rPr lang="es-MX" dirty="0"/>
+              <a:t>de  </a:t>
+            </a:r>
+            <a:r>
+              <a:rPr lang="es-MX" dirty="0" smtClean="0"/>
+              <a:t>asignar un perfil diseñado, recomendar </a:t>
+            </a:r>
+            <a:r>
+              <a:rPr lang="es-MX" dirty="0" smtClean="0"/>
+              <a:t>y agendar los eventos cercanos.</a:t>
+            </a:r>
+          </a:p>
+          <a:p>
+            <a:pPr lvl="1">
+              <a:buFont typeface="Wingdings" panose="05000000000000000000" pitchFamily="2" charset="2"/>
+              <a:buChar char="§"/>
+            </a:pPr>
+            <a:r>
+              <a:rPr lang="es-MX" dirty="0" smtClean="0"/>
+              <a:t> La seguridad y bienestar de los usuarios. </a:t>
+            </a:r>
+          </a:p>
+          <a:p>
+            <a:pPr lvl="1">
+              <a:buFont typeface="Wingdings" panose="05000000000000000000" pitchFamily="2" charset="2"/>
+              <a:buChar char="§"/>
+            </a:pPr>
+            <a:r>
+              <a:rPr lang="es-MX" dirty="0" smtClean="0"/>
+              <a:t>Facilidad en el aprendizaje para la ubicación y navegación dentro de la aplicación.</a:t>
+            </a:r>
+            <a:endParaRPr lang="es-MX" dirty="0" smtClean="0"/>
+          </a:p>
+          <a:p>
+            <a:pPr lvl="1">
+              <a:buFont typeface="Wingdings" panose="05000000000000000000" pitchFamily="2" charset="2"/>
+              <a:buChar char="§"/>
+            </a:pPr>
+            <a:endParaRPr lang="es-MX" dirty="0" smtClean="0"/>
+          </a:p>
+          <a:p>
+            <a:pPr lvl="1">
+              <a:buFont typeface="Wingdings" panose="05000000000000000000" pitchFamily="2" charset="2"/>
+              <a:buChar char="§"/>
+            </a:pPr>
             <a:endParaRPr lang="es-MX" dirty="0"/>
           </a:p>
         </p:txBody>
@@ -8216,6 +8291,10 @@
                 <a:latin typeface="Yanone Kaffeesatz" panose="020B0604020202020204" charset="0"/>
               </a:rPr>
               <a:t>resentación de pruebas iniciales de usabilidad</a:t>
+            </a:r>
+            <a:r>
+              <a:rPr lang="es-MX" sz="4400" dirty="0"/>
+              <a:t/>
             </a:r>
             <a:br>
               <a:rPr lang="es-MX" sz="4400" dirty="0"/>

</xml_diff>

<commit_message>
Actualización de cambios en el ppt
Agregado parte del plan de pruebas de usabilidad
</commit_message>
<xml_diff>
--- a/Segunda entrega/SegundaEntrega.pptx
+++ b/Segunda entrega/SegundaEntrega.pptx
@@ -22,19 +22,19 @@
   <p:notesSz cx="6858000" cy="9144000"/>
   <p:embeddedFontLst>
     <p:embeddedFont>
-      <p:font typeface="Oswald" panose="020B0604020202020204" charset="0"/>
+      <p:font typeface="Yanone Kaffeesatz" panose="020B0604020202020204" charset="0"/>
       <p:regular r:id="rId12"/>
       <p:bold r:id="rId13"/>
     </p:embeddedFont>
     <p:embeddedFont>
-      <p:font typeface="Source Sans Pro" panose="020B0503030403020204" pitchFamily="34" charset="0"/>
+      <p:font typeface="Source Sans Pro" panose="020B0604020202020204" charset="0"/>
       <p:regular r:id="rId14"/>
       <p:bold r:id="rId15"/>
       <p:italic r:id="rId16"/>
       <p:boldItalic r:id="rId17"/>
     </p:embeddedFont>
     <p:embeddedFont>
-      <p:font typeface="Yanone Kaffeesatz" panose="020B0604020202020204" charset="0"/>
+      <p:font typeface="Oswald" panose="020B0604020202020204" charset="0"/>
       <p:regular r:id="rId18"/>
       <p:bold r:id="rId19"/>
     </p:embeddedFont>
@@ -8164,11 +8164,86 @@
             <p:ph type="body" idx="1"/>
           </p:nvPr>
         </p:nvSpPr>
-        <p:spPr/>
+        <p:spPr>
+          <a:xfrm>
+            <a:off x="1075850" y="1540174"/>
+            <a:ext cx="6996600" cy="2648367"/>
+          </a:xfrm>
+        </p:spPr>
         <p:txBody>
           <a:bodyPr/>
           <a:lstStyle/>
           <a:p>
+            <a:r>
+              <a:rPr lang="es-MX" dirty="0" smtClean="0"/>
+              <a:t>Los participantes tiene la característica importante de querer cambiar. </a:t>
+            </a:r>
+          </a:p>
+          <a:p>
+            <a:r>
+              <a:rPr lang="es-MX" dirty="0" smtClean="0"/>
+              <a:t>Las pruebas iniciales de usabilidad tienen prioridad:</a:t>
+            </a:r>
+          </a:p>
+          <a:p>
+            <a:pPr lvl="1">
+              <a:buFont typeface="Wingdings" panose="05000000000000000000" pitchFamily="2" charset="2"/>
+              <a:buChar char="§"/>
+            </a:pPr>
+            <a:r>
+              <a:rPr lang="es-MX" dirty="0"/>
+              <a:t>E</a:t>
+            </a:r>
+            <a:r>
+              <a:rPr lang="es-MX" dirty="0" smtClean="0"/>
+              <a:t>n la eficiencia </a:t>
+            </a:r>
+            <a:r>
+              <a:rPr lang="es-MX" dirty="0"/>
+              <a:t>de  </a:t>
+            </a:r>
+            <a:r>
+              <a:rPr lang="es-MX" dirty="0" smtClean="0"/>
+              <a:t>asignar un perfil diseñado, recomendar </a:t>
+            </a:r>
+            <a:r>
+              <a:rPr lang="es-MX" dirty="0" smtClean="0"/>
+              <a:t>y agendar los eventos cercanos.</a:t>
+            </a:r>
+          </a:p>
+          <a:p>
+            <a:pPr lvl="1">
+              <a:buFont typeface="Wingdings" panose="05000000000000000000" pitchFamily="2" charset="2"/>
+              <a:buChar char="§"/>
+            </a:pPr>
+            <a:r>
+              <a:rPr lang="es-MX" dirty="0" smtClean="0"/>
+              <a:t> La seguridad y bienestar de los usuarios. </a:t>
+            </a:r>
+          </a:p>
+          <a:p>
+            <a:pPr lvl="1">
+              <a:buFont typeface="Wingdings" panose="05000000000000000000" pitchFamily="2" charset="2"/>
+              <a:buChar char="§"/>
+            </a:pPr>
+            <a:r>
+              <a:rPr lang="es-MX" dirty="0" smtClean="0"/>
+              <a:t>Facilidad en el aprendizaje para la ubicación y navegación dentro de la aplicación.</a:t>
+            </a:r>
+            <a:endParaRPr lang="es-MX" dirty="0" smtClean="0"/>
+          </a:p>
+          <a:p>
+            <a:pPr lvl="1">
+              <a:buFont typeface="Wingdings" panose="05000000000000000000" pitchFamily="2" charset="2"/>
+              <a:buChar char="§"/>
+            </a:pPr>
+            <a:endParaRPr lang="es-MX" dirty="0" smtClean="0"/>
+          </a:p>
+          <a:p>
+            <a:pPr lvl="1">
+              <a:buFont typeface="Wingdings" panose="05000000000000000000" pitchFamily="2" charset="2"/>
+              <a:buChar char="§"/>
+            </a:pPr>
             <a:endParaRPr lang="es-MX" dirty="0"/>
           </a:p>
         </p:txBody>
@@ -8216,6 +8291,10 @@
                 <a:latin typeface="Yanone Kaffeesatz" panose="020B0604020202020204" charset="0"/>
               </a:rPr>
               <a:t>resentación de pruebas iniciales de usabilidad</a:t>
+            </a:r>
+            <a:r>
+              <a:rPr lang="es-MX" sz="4400" dirty="0"/>
+              <a:t/>
             </a:r>
             <a:br>
               <a:rPr lang="es-MX" sz="4400" dirty="0"/>

</xml_diff>